<commit_message>
Exnd Of Semester presentation update
</commit_message>
<xml_diff>
--- a/materials/endOfSemseter.pptx
+++ b/materials/endOfSemseter.pptx
@@ -864,10 +864,7 @@
               <a:buFont typeface="Arial"/>
               <a:buNone/>
             </a:pPr>
-            <a:r>
-              <a:rPr lang="iw-IL"/>
-              <a:t>We would like to take the time in this meeting and go through Servi mobile and web application as well as discuss go to market strategies development and business milestones and other financial aspects. If you have any more topics you would like to raise feel free to do so.</a:t>
-            </a:r>
+            <a:endParaRPr lang="x-none" dirty="0"/>
           </a:p>
         </p:txBody>
       </p:sp>
@@ -993,9 +990,10 @@
               <a:buNone/>
             </a:pPr>
             <a:r>
-              <a:rPr lang="iw-IL"/>
-              <a:t>We would like to take the time in this meeting and go through Servi mobile and web application as well as discuss go to market strategies development and business milestones and other financial aspects. If you have any more topics you would like to raise feel free to do so.</a:t>
+              <a:rPr lang="en-US" dirty="0" smtClean="0"/>
+              <a:t>	</a:t>
             </a:r>
+            <a:endParaRPr lang="x-none" dirty="0"/>
           </a:p>
         </p:txBody>
       </p:sp>
@@ -1120,10 +1118,7 @@
               <a:buFont typeface="Arial"/>
               <a:buNone/>
             </a:pPr>
-            <a:r>
-              <a:rPr lang="iw-IL"/>
-              <a:t>We would like to take the time in this meeting and go through Servi mobile and web application as well as discuss go to market strategies development and business milestones and other financial aspects. If you have any more topics you would like to raise feel free to do so.</a:t>
-            </a:r>
+            <a:endParaRPr lang="x-none" dirty="0"/>
           </a:p>
         </p:txBody>
       </p:sp>
@@ -1248,10 +1243,7 @@
               <a:buFont typeface="Arial"/>
               <a:buNone/>
             </a:pPr>
-            <a:r>
-              <a:rPr lang="iw-IL"/>
-              <a:t>We would like to take the time in this meeting and go through Servi mobile and web application as well as discuss go to market strategies development and business milestones and other financial aspects. If you have any more topics you would like to raise feel free to do so.</a:t>
-            </a:r>
+            <a:endParaRPr lang="x-none" dirty="0"/>
           </a:p>
         </p:txBody>
       </p:sp>
@@ -2025,10 +2017,7 @@
               <a:buFont typeface="Arial"/>
               <a:buNone/>
             </a:pPr>
-            <a:r>
-              <a:rPr lang="iw-IL"/>
-              <a:t>We would like to take the time in this meeting and go through Servi mobile and web application as well as discuss go to market strategies development and business milestones and other financial aspects. If you have any more topics you would like to raise feel free to do so.</a:t>
-            </a:r>
+            <a:endParaRPr lang="x-none" dirty="0"/>
           </a:p>
         </p:txBody>
       </p:sp>
@@ -2142,7 +2131,7 @@
           </a:bodyPr>
           <a:lstStyle/>
           <a:p>
-            <a:pPr marL="0" marR="0" lvl="0" indent="-88899" algn="r" rtl="1">
+            <a:pPr marL="0" marR="0" lvl="0" indent="-88899" algn="r" defTabSz="914400" rtl="1" eaLnBrk="1" latinLnBrk="0" hangingPunct="1">
               <a:spcBef>
                 <a:spcPts val="0"/>
               </a:spcBef>
@@ -2153,7 +2142,31 @@
               <a:buFont typeface="Arial"/>
               <a:buNone/>
             </a:pPr>
-            <a:endParaRPr sz="1100" b="0" i="0" u="none" strike="noStrike" cap="none">
+            <a:r>
+              <a:rPr lang="he-IL" sz="1100" b="0" i="0" u="none" strike="noStrike" cap="none" dirty="0" smtClean="0">
+                <a:solidFill>
+                  <a:schemeClr val="dk1"/>
+                </a:solidFill>
+                <a:latin typeface="Arial"/>
+                <a:ea typeface="Arial"/>
+                <a:cs typeface="Arial"/>
+                <a:sym typeface="Arial"/>
+              </a:rPr>
+              <a:t>כל</a:t>
+            </a:r>
+            <a:r>
+              <a:rPr lang="he-IL" sz="1100" b="0" i="0" u="none" strike="noStrike" cap="none" baseline="0" dirty="0" smtClean="0">
+                <a:solidFill>
+                  <a:schemeClr val="dk1"/>
+                </a:solidFill>
+                <a:latin typeface="Arial"/>
+                <a:ea typeface="Arial"/>
+                <a:cs typeface="Arial"/>
+                <a:sym typeface="Arial"/>
+              </a:rPr>
+              <a:t> שנותר הוא להוסיף סנסורים ולחבר לאלגוריתמיקה והרי לנו עיר חכמה</a:t>
+            </a:r>
+            <a:endParaRPr sz="1100" b="0" i="0" u="none" strike="noStrike" cap="none" dirty="0">
               <a:solidFill>
                 <a:schemeClr val="dk1"/>
               </a:solidFill>
@@ -5262,7 +5275,7 @@
               <a:buNone/>
             </a:pPr>
             <a:fld id="{00000000-1234-1234-1234-123412341234}" type="slidenum">
-              <a:rPr lang="iw-IL" sz="1400" b="0" i="0" u="none" strike="noStrike" cap="none">
+              <a:rPr lang="x-none" sz="1400" b="0" i="0" u="none" strike="noStrike" cap="none">
                 <a:solidFill>
                   <a:srgbClr val="FFB600"/>
                 </a:solidFill>
@@ -5273,7 +5286,7 @@
               </a:rPr>
               <a:t>‹#›</a:t>
             </a:fld>
-            <a:endParaRPr lang="iw-IL" sz="1400" b="0" i="0" u="none" strike="noStrike" cap="none">
+            <a:endParaRPr lang="x-none" sz="1400" b="0" i="0" u="none" strike="noStrike" cap="none">
               <a:solidFill>
                 <a:srgbClr val="FFB600"/>
               </a:solidFill>
@@ -6397,6 +6410,18 @@
               <a:buFont typeface="Raleway ExtraBold"/>
               <a:buNone/>
             </a:pPr>
+            <a:r>
+              <a:rPr lang="x-none" sz="4400" b="0" i="0" u="none" strike="noStrike" cap="none" dirty="0">
+                <a:solidFill>
+                  <a:srgbClr val="FFFFFF"/>
+                </a:solidFill>
+                <a:latin typeface="Raleway ExtraBold"/>
+                <a:ea typeface="Raleway ExtraBold"/>
+                <a:cs typeface="Raleway ExtraBold"/>
+                <a:sym typeface="Raleway ExtraBold"/>
+              </a:rPr>
+              <a:t/>
+            </a:r>
             <a:br>
               <a:rPr lang="x-none" sz="4400" b="0" i="0" u="none" strike="noStrike" cap="none" dirty="0">
                 <a:solidFill>
@@ -6570,7 +6595,7 @@
           <p:cNvPr id="3" name="תמונה 2">
             <a:extLst>
               <a:ext uri="{FF2B5EF4-FFF2-40B4-BE49-F238E27FC236}">
-                <a16:creationId xmlns:a16="http://schemas.microsoft.com/office/drawing/2014/main" id="{A411248A-21F4-405E-8A65-9FCA8ECC0744}"/>
+                <a16:creationId xmlns="" xmlns:a16="http://schemas.microsoft.com/office/drawing/2014/main" id="{A411248A-21F4-405E-8A65-9FCA8ECC0744}"/>
               </a:ext>
             </a:extLst>
           </p:cNvPr>
@@ -6800,10 +6825,14 @@
               </a:rPr>
               <a:t>Evaluation</a:t>
             </a:r>
+            <a:r>
+              <a:rPr lang="en-US" sz="4400" dirty="0"/>
+              <a:t/>
+            </a:r>
             <a:br>
               <a:rPr lang="en-US" sz="4400" dirty="0"/>
             </a:br>
-            <a:endParaRPr lang="iw-IL" sz="2800" b="0" i="0" u="none" strike="noStrike" cap="none" dirty="0">
+            <a:endParaRPr lang="x-none" sz="2800" b="0" i="0" u="none" strike="noStrike" cap="none" dirty="0">
               <a:solidFill>
                 <a:srgbClr val="434343"/>
               </a:solidFill>
@@ -6860,7 +6889,7 @@
               <a:buNone/>
             </a:pPr>
             <a:fld id="{00000000-1234-1234-1234-123412341234}" type="slidenum">
-              <a:rPr lang="iw-IL" sz="1400" b="0" i="0" u="none" strike="noStrike" cap="none">
+              <a:rPr lang="x-none" sz="1400" b="0" i="0" u="none" strike="noStrike" cap="none">
                 <a:solidFill>
                   <a:srgbClr val="000000"/>
                 </a:solidFill>
@@ -6871,7 +6900,7 @@
               </a:rPr>
               <a:t>10</a:t>
             </a:fld>
-            <a:endParaRPr lang="iw-IL" sz="1400" b="0" i="0" u="none" strike="noStrike" cap="none">
+            <a:endParaRPr lang="x-none" sz="1400" b="0" i="0" u="none" strike="noStrike" cap="none">
               <a:solidFill>
                 <a:srgbClr val="000000"/>
               </a:solidFill>
@@ -7615,7 +7644,7 @@
           <p:cNvPr id="11" name="Shape 120">
             <a:extLst>
               <a:ext uri="{FF2B5EF4-FFF2-40B4-BE49-F238E27FC236}">
-                <a16:creationId xmlns:a16="http://schemas.microsoft.com/office/drawing/2014/main" id="{7D209ED9-458B-43E3-9607-2EAA917A8C69}"/>
+                <a16:creationId xmlns="" xmlns:a16="http://schemas.microsoft.com/office/drawing/2014/main" id="{7D209ED9-458B-43E3-9607-2EAA917A8C69}"/>
               </a:ext>
             </a:extLst>
           </p:cNvPr>
@@ -7659,7 +7688,7 @@
           <p:cNvPr id="12" name="Shape 120">
             <a:extLst>
               <a:ext uri="{FF2B5EF4-FFF2-40B4-BE49-F238E27FC236}">
-                <a16:creationId xmlns:a16="http://schemas.microsoft.com/office/drawing/2014/main" id="{414827B1-50B4-4198-9F8D-5C7BF93CCB18}"/>
+                <a16:creationId xmlns="" xmlns:a16="http://schemas.microsoft.com/office/drawing/2014/main" id="{414827B1-50B4-4198-9F8D-5C7BF93CCB18}"/>
               </a:ext>
             </a:extLst>
           </p:cNvPr>
@@ -7703,7 +7732,7 @@
           <p:cNvPr id="13" name="Shape 120">
             <a:extLst>
               <a:ext uri="{FF2B5EF4-FFF2-40B4-BE49-F238E27FC236}">
-                <a16:creationId xmlns:a16="http://schemas.microsoft.com/office/drawing/2014/main" id="{A592296E-6C58-4A54-93C9-42E7F960DA6C}"/>
+                <a16:creationId xmlns="" xmlns:a16="http://schemas.microsoft.com/office/drawing/2014/main" id="{A592296E-6C58-4A54-93C9-42E7F960DA6C}"/>
               </a:ext>
             </a:extLst>
           </p:cNvPr>
@@ -7747,7 +7776,7 @@
           <p:cNvPr id="14" name="Shape 120">
             <a:extLst>
               <a:ext uri="{FF2B5EF4-FFF2-40B4-BE49-F238E27FC236}">
-                <a16:creationId xmlns:a16="http://schemas.microsoft.com/office/drawing/2014/main" id="{D636E29E-4D07-4161-ABC9-681FB318A520}"/>
+                <a16:creationId xmlns="" xmlns:a16="http://schemas.microsoft.com/office/drawing/2014/main" id="{D636E29E-4D07-4161-ABC9-681FB318A520}"/>
               </a:ext>
             </a:extLst>
           </p:cNvPr>
@@ -7803,7 +7832,7 @@
           <p:cNvPr id="5" name="תמונה 4">
             <a:extLst>
               <a:ext uri="{FF2B5EF4-FFF2-40B4-BE49-F238E27FC236}">
-                <a16:creationId xmlns:a16="http://schemas.microsoft.com/office/drawing/2014/main" id="{941C507B-7A97-4925-95E9-08591644082A}"/>
+                <a16:creationId xmlns="" xmlns:a16="http://schemas.microsoft.com/office/drawing/2014/main" id="{941C507B-7A97-4925-95E9-08591644082A}"/>
               </a:ext>
             </a:extLst>
           </p:cNvPr>
@@ -7833,7 +7862,7 @@
           <p:cNvPr id="7" name="תמונה 6">
             <a:extLst>
               <a:ext uri="{FF2B5EF4-FFF2-40B4-BE49-F238E27FC236}">
-                <a16:creationId xmlns:a16="http://schemas.microsoft.com/office/drawing/2014/main" id="{71D52B29-30E6-4A4D-A5C4-24860AC34571}"/>
+                <a16:creationId xmlns="" xmlns:a16="http://schemas.microsoft.com/office/drawing/2014/main" id="{71D52B29-30E6-4A4D-A5C4-24860AC34571}"/>
               </a:ext>
             </a:extLst>
           </p:cNvPr>
@@ -7863,7 +7892,7 @@
           <p:cNvPr id="9" name="תמונה 8">
             <a:extLst>
               <a:ext uri="{FF2B5EF4-FFF2-40B4-BE49-F238E27FC236}">
-                <a16:creationId xmlns:a16="http://schemas.microsoft.com/office/drawing/2014/main" id="{2306EFAE-3D4D-4D0A-8E1E-0461AE026C0A}"/>
+                <a16:creationId xmlns="" xmlns:a16="http://schemas.microsoft.com/office/drawing/2014/main" id="{2306EFAE-3D4D-4D0A-8E1E-0461AE026C0A}"/>
               </a:ext>
             </a:extLst>
           </p:cNvPr>
@@ -7893,7 +7922,7 @@
           <p:cNvPr id="15" name="תמונה 14">
             <a:extLst>
               <a:ext uri="{FF2B5EF4-FFF2-40B4-BE49-F238E27FC236}">
-                <a16:creationId xmlns:a16="http://schemas.microsoft.com/office/drawing/2014/main" id="{50BD4322-062D-4938-BD46-6BFC0E980DA8}"/>
+                <a16:creationId xmlns="" xmlns:a16="http://schemas.microsoft.com/office/drawing/2014/main" id="{50BD4322-062D-4938-BD46-6BFC0E980DA8}"/>
               </a:ext>
             </a:extLst>
           </p:cNvPr>
@@ -7923,7 +7952,7 @@
           <p:cNvPr id="19" name="Shape 120">
             <a:extLst>
               <a:ext uri="{FF2B5EF4-FFF2-40B4-BE49-F238E27FC236}">
-                <a16:creationId xmlns:a16="http://schemas.microsoft.com/office/drawing/2014/main" id="{382294A2-A1D8-473D-938A-B19C67B1592B}"/>
+                <a16:creationId xmlns="" xmlns:a16="http://schemas.microsoft.com/office/drawing/2014/main" id="{382294A2-A1D8-473D-938A-B19C67B1592B}"/>
               </a:ext>
             </a:extLst>
           </p:cNvPr>
@@ -7967,7 +7996,7 @@
           <p:cNvPr id="4" name="תמונה 3">
             <a:extLst>
               <a:ext uri="{FF2B5EF4-FFF2-40B4-BE49-F238E27FC236}">
-                <a16:creationId xmlns:a16="http://schemas.microsoft.com/office/drawing/2014/main" id="{2CEDEB26-2760-4E30-A38C-7666CDCE6F95}"/>
+                <a16:creationId xmlns="" xmlns:a16="http://schemas.microsoft.com/office/drawing/2014/main" id="{2CEDEB26-2760-4E30-A38C-7666CDCE6F95}"/>
               </a:ext>
             </a:extLst>
           </p:cNvPr>
@@ -8596,7 +8625,7 @@
               </a:rPr>
               <a:t>Logging</a:t>
             </a:r>
-            <a:endParaRPr lang="iw-IL" sz="2800" b="0" i="0" u="none" strike="noStrike" cap="none" dirty="0">
+            <a:endParaRPr lang="x-none" sz="2800" b="0" i="0" u="none" strike="noStrike" cap="none" dirty="0">
               <a:solidFill>
                 <a:srgbClr val="FFB600"/>
               </a:solidFill>
@@ -8653,7 +8682,7 @@
               <a:buNone/>
             </a:pPr>
             <a:fld id="{00000000-1234-1234-1234-123412341234}" type="slidenum">
-              <a:rPr lang="iw-IL" sz="1400" b="0" i="0" u="none" strike="noStrike" cap="none">
+              <a:rPr lang="x-none" sz="1400" b="0" i="0" u="none" strike="noStrike" cap="none">
                 <a:solidFill>
                   <a:srgbClr val="000000"/>
                 </a:solidFill>
@@ -8664,7 +8693,7 @@
               </a:rPr>
               <a:t>11</a:t>
             </a:fld>
-            <a:endParaRPr lang="iw-IL" sz="1400" b="0" i="0" u="none" strike="noStrike" cap="none">
+            <a:endParaRPr lang="x-none" sz="1400" b="0" i="0" u="none" strike="noStrike" cap="none">
               <a:solidFill>
                 <a:srgbClr val="000000"/>
               </a:solidFill>
@@ -9408,7 +9437,7 @@
           <p:cNvPr id="12" name="Shape 120">
             <a:extLst>
               <a:ext uri="{FF2B5EF4-FFF2-40B4-BE49-F238E27FC236}">
-                <a16:creationId xmlns:a16="http://schemas.microsoft.com/office/drawing/2014/main" id="{59E79919-20C2-4F15-B0BC-F1E20DA1E04A}"/>
+                <a16:creationId xmlns="" xmlns:a16="http://schemas.microsoft.com/office/drawing/2014/main" id="{59E79919-20C2-4F15-B0BC-F1E20DA1E04A}"/>
               </a:ext>
             </a:extLst>
           </p:cNvPr>
@@ -9452,7 +9481,7 @@
           <p:cNvPr id="13" name="Shape 120">
             <a:extLst>
               <a:ext uri="{FF2B5EF4-FFF2-40B4-BE49-F238E27FC236}">
-                <a16:creationId xmlns:a16="http://schemas.microsoft.com/office/drawing/2014/main" id="{57BB212C-B343-44F9-A16C-DD2ADB1B6278}"/>
+                <a16:creationId xmlns="" xmlns:a16="http://schemas.microsoft.com/office/drawing/2014/main" id="{57BB212C-B343-44F9-A16C-DD2ADB1B6278}"/>
               </a:ext>
             </a:extLst>
           </p:cNvPr>
@@ -9496,7 +9525,7 @@
           <p:cNvPr id="14" name="Shape 120">
             <a:extLst>
               <a:ext uri="{FF2B5EF4-FFF2-40B4-BE49-F238E27FC236}">
-                <a16:creationId xmlns:a16="http://schemas.microsoft.com/office/drawing/2014/main" id="{20ABB0CE-E571-4590-BC9D-7AC8CE71B917}"/>
+                <a16:creationId xmlns="" xmlns:a16="http://schemas.microsoft.com/office/drawing/2014/main" id="{20ABB0CE-E571-4590-BC9D-7AC8CE71B917}"/>
               </a:ext>
             </a:extLst>
           </p:cNvPr>
@@ -9554,7 +9583,7 @@
           <p:cNvPr id="15" name="תמונה 14">
             <a:extLst>
               <a:ext uri="{FF2B5EF4-FFF2-40B4-BE49-F238E27FC236}">
-                <a16:creationId xmlns:a16="http://schemas.microsoft.com/office/drawing/2014/main" id="{D3228186-A14B-4104-B005-7591EAD2A6C5}"/>
+                <a16:creationId xmlns="" xmlns:a16="http://schemas.microsoft.com/office/drawing/2014/main" id="{D3228186-A14B-4104-B005-7591EAD2A6C5}"/>
               </a:ext>
             </a:extLst>
           </p:cNvPr>
@@ -9584,7 +9613,7 @@
           <p:cNvPr id="5" name="תמונה 4">
             <a:extLst>
               <a:ext uri="{FF2B5EF4-FFF2-40B4-BE49-F238E27FC236}">
-                <a16:creationId xmlns:a16="http://schemas.microsoft.com/office/drawing/2014/main" id="{455C4DFB-4624-4F7F-B920-8FC2BD692A04}"/>
+                <a16:creationId xmlns="" xmlns:a16="http://schemas.microsoft.com/office/drawing/2014/main" id="{455C4DFB-4624-4F7F-B920-8FC2BD692A04}"/>
               </a:ext>
             </a:extLst>
           </p:cNvPr>
@@ -9614,7 +9643,7 @@
           <p:cNvPr id="7" name="תמונה 6">
             <a:extLst>
               <a:ext uri="{FF2B5EF4-FFF2-40B4-BE49-F238E27FC236}">
-                <a16:creationId xmlns:a16="http://schemas.microsoft.com/office/drawing/2014/main" id="{19D223FB-70B5-41F0-9E0D-CAB9A9CEBACA}"/>
+                <a16:creationId xmlns="" xmlns:a16="http://schemas.microsoft.com/office/drawing/2014/main" id="{19D223FB-70B5-41F0-9E0D-CAB9A9CEBACA}"/>
               </a:ext>
             </a:extLst>
           </p:cNvPr>
@@ -10121,6 +10150,13 @@
   <p:clrMapOvr>
     <a:masterClrMapping/>
   </p:clrMapOvr>
+  <p:timing>
+    <p:tnLst>
+      <p:par>
+        <p:cTn id="1" dur="indefinite" restart="never" nodeType="tmRoot"/>
+      </p:par>
+    </p:tnLst>
+  </p:timing>
 </p:sld>
 </file>
 
@@ -10185,6 +10221,10 @@
               </a:rPr>
               <a:t> Steps</a:t>
             </a:r>
+            <a:r>
+              <a:rPr lang="en-US" sz="4400" dirty="0"/>
+              <a:t/>
+            </a:r>
             <a:br>
               <a:rPr lang="en-US" sz="4400" dirty="0"/>
             </a:br>
@@ -10194,7 +10234,7 @@
               </a:rPr>
               <a:t>Advanced Features</a:t>
             </a:r>
-            <a:endParaRPr lang="iw-IL" sz="2800" b="0" i="0" u="none" strike="noStrike" cap="none" dirty="0">
+            <a:endParaRPr lang="x-none" sz="2800" b="0" i="0" u="none" strike="noStrike" cap="none" dirty="0">
               <a:solidFill>
                 <a:srgbClr val="434343"/>
               </a:solidFill>
@@ -10326,7 +10366,7 @@
               <a:buNone/>
             </a:pPr>
             <a:fld id="{00000000-1234-1234-1234-123412341234}" type="slidenum">
-              <a:rPr lang="iw-IL" sz="1400" b="0" i="0" u="none" strike="noStrike" cap="none">
+              <a:rPr lang="x-none" sz="1400" b="0" i="0" u="none" strike="noStrike" cap="none">
                 <a:solidFill>
                   <a:srgbClr val="000000"/>
                 </a:solidFill>
@@ -10337,7 +10377,7 @@
               </a:rPr>
               <a:t>13</a:t>
             </a:fld>
-            <a:endParaRPr lang="iw-IL" sz="1400" b="0" i="0" u="none" strike="noStrike" cap="none">
+            <a:endParaRPr lang="x-none" sz="1400" b="0" i="0" u="none" strike="noStrike" cap="none">
               <a:solidFill>
                 <a:srgbClr val="000000"/>
               </a:solidFill>
@@ -11086,6 +11126,13 @@
   <p:clrMapOvr>
     <a:masterClrMapping/>
   </p:clrMapOvr>
+  <p:timing>
+    <p:tnLst>
+      <p:par>
+        <p:cTn id="1" dur="indefinite" restart="never" nodeType="tmRoot"/>
+      </p:par>
+    </p:tnLst>
+  </p:timing>
 </p:sld>
 </file>
 
@@ -11150,6 +11197,10 @@
               </a:rPr>
               <a:t> Steps</a:t>
             </a:r>
+            <a:r>
+              <a:rPr lang="en-US" sz="4400" dirty="0"/>
+              <a:t/>
+            </a:r>
             <a:br>
               <a:rPr lang="en-US" sz="4400" dirty="0"/>
             </a:br>
@@ -11159,7 +11210,7 @@
               </a:rPr>
               <a:t>Management GUI</a:t>
             </a:r>
-            <a:endParaRPr lang="iw-IL" sz="2800" b="0" i="0" u="none" strike="noStrike" cap="none" dirty="0">
+            <a:endParaRPr lang="x-none" sz="2800" b="0" i="0" u="none" strike="noStrike" cap="none" dirty="0">
               <a:solidFill>
                 <a:srgbClr val="434343"/>
               </a:solidFill>
@@ -11302,7 +11353,7 @@
               <a:buNone/>
             </a:pPr>
             <a:fld id="{00000000-1234-1234-1234-123412341234}" type="slidenum">
-              <a:rPr lang="iw-IL" sz="1400" b="0" i="0" u="none" strike="noStrike" cap="none">
+              <a:rPr lang="x-none" sz="1400" b="0" i="0" u="none" strike="noStrike" cap="none">
                 <a:solidFill>
                   <a:srgbClr val="000000"/>
                 </a:solidFill>
@@ -11313,7 +11364,7 @@
               </a:rPr>
               <a:t>14</a:t>
             </a:fld>
-            <a:endParaRPr lang="iw-IL" sz="1400" b="0" i="0" u="none" strike="noStrike" cap="none">
+            <a:endParaRPr lang="x-none" sz="1400" b="0" i="0" u="none" strike="noStrike" cap="none">
               <a:solidFill>
                 <a:srgbClr val="000000"/>
               </a:solidFill>
@@ -12062,6 +12113,13 @@
   <p:clrMapOvr>
     <a:masterClrMapping/>
   </p:clrMapOvr>
+  <p:timing>
+    <p:tnLst>
+      <p:par>
+        <p:cTn id="1" dur="indefinite" restart="never" nodeType="tmRoot"/>
+      </p:par>
+    </p:tnLst>
+  </p:timing>
 </p:sld>
 </file>
 
@@ -12772,6 +12830,13 @@
   <p:clrMapOvr>
     <a:masterClrMapping/>
   </p:clrMapOvr>
+  <p:timing>
+    <p:tnLst>
+      <p:par>
+        <p:cTn id="1" dur="indefinite" restart="never" nodeType="tmRoot"/>
+      </p:par>
+    </p:tnLst>
+  </p:timing>
 </p:sld>
 </file>
 
@@ -12797,7 +12862,7 @@
           <p:cNvPr id="28" name="תמונה 4">
             <a:extLst>
               <a:ext uri="{FF2B5EF4-FFF2-40B4-BE49-F238E27FC236}">
-                <a16:creationId xmlns:a16="http://schemas.microsoft.com/office/drawing/2014/main" id="{FB66E08C-5DC0-4ABD-B0A6-5FB13E986FD9}"/>
+                <a16:creationId xmlns="" xmlns:a16="http://schemas.microsoft.com/office/drawing/2014/main" id="{FB66E08C-5DC0-4ABD-B0A6-5FB13E986FD9}"/>
               </a:ext>
             </a:extLst>
           </p:cNvPr>
@@ -12855,7 +12920,7 @@
           <p:cNvPr id="15" name="תמונה 14">
             <a:extLst>
               <a:ext uri="{FF2B5EF4-FFF2-40B4-BE49-F238E27FC236}">
-                <a16:creationId xmlns:a16="http://schemas.microsoft.com/office/drawing/2014/main" id="{217F2B99-A964-403F-BAC0-82354EEA57DD}"/>
+                <a16:creationId xmlns="" xmlns:a16="http://schemas.microsoft.com/office/drawing/2014/main" id="{217F2B99-A964-403F-BAC0-82354EEA57DD}"/>
               </a:ext>
             </a:extLst>
           </p:cNvPr>
@@ -12906,7 +12971,7 @@
           <p:cNvPr id="13" name="תמונה 12">
             <a:extLst>
               <a:ext uri="{FF2B5EF4-FFF2-40B4-BE49-F238E27FC236}">
-                <a16:creationId xmlns:a16="http://schemas.microsoft.com/office/drawing/2014/main" id="{B0549EAA-6F9B-42F0-BC42-ABD8BB98F11C}"/>
+                <a16:creationId xmlns="" xmlns:a16="http://schemas.microsoft.com/office/drawing/2014/main" id="{B0549EAA-6F9B-42F0-BC42-ABD8BB98F11C}"/>
               </a:ext>
             </a:extLst>
           </p:cNvPr>
@@ -12964,7 +13029,7 @@
           <p:cNvPr id="11" name="תמונה 10">
             <a:extLst>
               <a:ext uri="{FF2B5EF4-FFF2-40B4-BE49-F238E27FC236}">
-                <a16:creationId xmlns:a16="http://schemas.microsoft.com/office/drawing/2014/main" id="{B959F5C2-0943-4036-852D-319C2F9652D6}"/>
+                <a16:creationId xmlns="" xmlns:a16="http://schemas.microsoft.com/office/drawing/2014/main" id="{B959F5C2-0943-4036-852D-319C2F9652D6}"/>
               </a:ext>
             </a:extLst>
           </p:cNvPr>
@@ -13015,7 +13080,7 @@
           <p:cNvPr id="9" name="תמונה 8">
             <a:extLst>
               <a:ext uri="{FF2B5EF4-FFF2-40B4-BE49-F238E27FC236}">
-                <a16:creationId xmlns:a16="http://schemas.microsoft.com/office/drawing/2014/main" id="{7C78317B-6461-485D-ACB7-9F6D86FFB6BF}"/>
+                <a16:creationId xmlns="" xmlns:a16="http://schemas.microsoft.com/office/drawing/2014/main" id="{7C78317B-6461-485D-ACB7-9F6D86FFB6BF}"/>
               </a:ext>
             </a:extLst>
           </p:cNvPr>
@@ -13066,7 +13131,7 @@
           <p:cNvPr id="5" name="תמונה 4">
             <a:extLst>
               <a:ext uri="{FF2B5EF4-FFF2-40B4-BE49-F238E27FC236}">
-                <a16:creationId xmlns:a16="http://schemas.microsoft.com/office/drawing/2014/main" id="{8E0D8C80-BA63-472B-BC85-0AF1E159B30D}"/>
+                <a16:creationId xmlns="" xmlns:a16="http://schemas.microsoft.com/office/drawing/2014/main" id="{8E0D8C80-BA63-472B-BC85-0AF1E159B30D}"/>
               </a:ext>
             </a:extLst>
           </p:cNvPr>
@@ -13117,7 +13182,7 @@
           <p:cNvPr id="3" name="תמונה 2">
             <a:extLst>
               <a:ext uri="{FF2B5EF4-FFF2-40B4-BE49-F238E27FC236}">
-                <a16:creationId xmlns:a16="http://schemas.microsoft.com/office/drawing/2014/main" id="{3F9781C7-2D6C-4E8A-9CEC-D2516FA85FC2}"/>
+                <a16:creationId xmlns="" xmlns:a16="http://schemas.microsoft.com/office/drawing/2014/main" id="{3F9781C7-2D6C-4E8A-9CEC-D2516FA85FC2}"/>
               </a:ext>
             </a:extLst>
           </p:cNvPr>
@@ -15597,7 +15662,7 @@
           <p:cNvPr id="26" name="Shape 78">
             <a:extLst>
               <a:ext uri="{FF2B5EF4-FFF2-40B4-BE49-F238E27FC236}">
-                <a16:creationId xmlns:a16="http://schemas.microsoft.com/office/drawing/2014/main" id="{F16C477C-8D57-48FB-BDC2-96EF0462CFEA}"/>
+                <a16:creationId xmlns="" xmlns:a16="http://schemas.microsoft.com/office/drawing/2014/main" id="{F16C477C-8D57-48FB-BDC2-96EF0462CFEA}"/>
               </a:ext>
             </a:extLst>
           </p:cNvPr>
@@ -15663,7 +15728,7 @@
           <p:cNvPr id="27" name="Shape 79">
             <a:extLst>
               <a:ext uri="{FF2B5EF4-FFF2-40B4-BE49-F238E27FC236}">
-                <a16:creationId xmlns:a16="http://schemas.microsoft.com/office/drawing/2014/main" id="{FA83FC01-AC62-4B6A-B9E7-0122CEDD05DB}"/>
+                <a16:creationId xmlns="" xmlns:a16="http://schemas.microsoft.com/office/drawing/2014/main" id="{FA83FC01-AC62-4B6A-B9E7-0122CEDD05DB}"/>
               </a:ext>
             </a:extLst>
           </p:cNvPr>
@@ -15787,6 +15852,13 @@
   <p:clrMapOvr>
     <a:masterClrMapping/>
   </p:clrMapOvr>
+  <p:timing>
+    <p:tnLst>
+      <p:par>
+        <p:cTn id="1" dur="indefinite" restart="never" nodeType="tmRoot"/>
+      </p:par>
+    </p:tnLst>
+  </p:timing>
 </p:sld>
 </file>
 
@@ -15890,7 +15962,7 @@
           <p:cNvPr id="3" name="תמונה 2">
             <a:extLst>
               <a:ext uri="{FF2B5EF4-FFF2-40B4-BE49-F238E27FC236}">
-                <a16:creationId xmlns:a16="http://schemas.microsoft.com/office/drawing/2014/main" id="{A411248A-21F4-405E-8A65-9FCA8ECC0744}"/>
+                <a16:creationId xmlns="" xmlns:a16="http://schemas.microsoft.com/office/drawing/2014/main" id="{A411248A-21F4-405E-8A65-9FCA8ECC0744}"/>
               </a:ext>
             </a:extLst>
           </p:cNvPr>
@@ -15920,7 +15992,7 @@
           <p:cNvPr id="10" name="Shape 104">
             <a:extLst>
               <a:ext uri="{FF2B5EF4-FFF2-40B4-BE49-F238E27FC236}">
-                <a16:creationId xmlns:a16="http://schemas.microsoft.com/office/drawing/2014/main" id="{82FBC332-790B-4DC7-9355-E01A91F5F023}"/>
+                <a16:creationId xmlns="" xmlns:a16="http://schemas.microsoft.com/office/drawing/2014/main" id="{82FBC332-790B-4DC7-9355-E01A91F5F023}"/>
               </a:ext>
             </a:extLst>
           </p:cNvPr>
@@ -16182,7 +16254,7 @@
           <p:cNvPr id="11" name="Shape 104">
             <a:extLst>
               <a:ext uri="{FF2B5EF4-FFF2-40B4-BE49-F238E27FC236}">
-                <a16:creationId xmlns:a16="http://schemas.microsoft.com/office/drawing/2014/main" id="{DE6DE8DC-90F6-4E85-BE33-853E748E6601}"/>
+                <a16:creationId xmlns="" xmlns:a16="http://schemas.microsoft.com/office/drawing/2014/main" id="{DE6DE8DC-90F6-4E85-BE33-853E748E6601}"/>
               </a:ext>
             </a:extLst>
           </p:cNvPr>
@@ -16453,7 +16525,7 @@
           <p:cNvPr id="8" name="תמונה 7" descr="תמונה שמכילה אובייקט&#10;&#10;תיאור שנוצר ברמת מהימנות גבוהה">
             <a:extLst>
               <a:ext uri="{FF2B5EF4-FFF2-40B4-BE49-F238E27FC236}">
-                <a16:creationId xmlns:a16="http://schemas.microsoft.com/office/drawing/2014/main" id="{6CC9618B-BA71-4E08-9BF5-9E0744848BF4}"/>
+                <a16:creationId xmlns="" xmlns:a16="http://schemas.microsoft.com/office/drawing/2014/main" id="{6CC9618B-BA71-4E08-9BF5-9E0744848BF4}"/>
               </a:ext>
             </a:extLst>
           </p:cNvPr>
@@ -19774,7 +19846,7 @@
           <p:cNvPr id="31" name="Shape 608">
             <a:extLst>
               <a:ext uri="{FF2B5EF4-FFF2-40B4-BE49-F238E27FC236}">
-                <a16:creationId xmlns:a16="http://schemas.microsoft.com/office/drawing/2014/main" id="{3C3406CB-9710-4324-9594-F6D9E6E4B494}"/>
+                <a16:creationId xmlns="" xmlns:a16="http://schemas.microsoft.com/office/drawing/2014/main" id="{3C3406CB-9710-4324-9594-F6D9E6E4B494}"/>
               </a:ext>
             </a:extLst>
           </p:cNvPr>
@@ -19794,7 +19866,7 @@
             <p:cNvPr id="32" name="Shape 609">
               <a:extLst>
                 <a:ext uri="{FF2B5EF4-FFF2-40B4-BE49-F238E27FC236}">
-                  <a16:creationId xmlns:a16="http://schemas.microsoft.com/office/drawing/2014/main" id="{D900634C-2D87-4E40-ADCD-777A4BC6A6FD}"/>
+                  <a16:creationId xmlns="" xmlns:a16="http://schemas.microsoft.com/office/drawing/2014/main" id="{D900634C-2D87-4E40-ADCD-777A4BC6A6FD}"/>
                 </a:ext>
               </a:extLst>
             </p:cNvPr>
@@ -19863,7 +19935,7 @@
             <p:cNvPr id="33" name="Shape 610">
               <a:extLst>
                 <a:ext uri="{FF2B5EF4-FFF2-40B4-BE49-F238E27FC236}">
-                  <a16:creationId xmlns:a16="http://schemas.microsoft.com/office/drawing/2014/main" id="{B1A786AC-B994-4262-A337-76A137C7A193}"/>
+                  <a16:creationId xmlns="" xmlns:a16="http://schemas.microsoft.com/office/drawing/2014/main" id="{B1A786AC-B994-4262-A337-76A137C7A193}"/>
                 </a:ext>
               </a:extLst>
             </p:cNvPr>
@@ -19925,7 +19997,7 @@
           <p:cNvPr id="30" name="Shape 116">
             <a:extLst>
               <a:ext uri="{FF2B5EF4-FFF2-40B4-BE49-F238E27FC236}">
-                <a16:creationId xmlns:a16="http://schemas.microsoft.com/office/drawing/2014/main" id="{87750F78-A854-42B9-B963-EC0831B63BF4}"/>
+                <a16:creationId xmlns="" xmlns:a16="http://schemas.microsoft.com/office/drawing/2014/main" id="{87750F78-A854-42B9-B963-EC0831B63BF4}"/>
               </a:ext>
             </a:extLst>
           </p:cNvPr>
@@ -20306,20 +20378,36 @@
               </a:rPr>
               <a:t>Idea</a:t>
             </a:r>
+            <a:r>
+              <a:rPr lang="en-US" sz="4400" dirty="0"/>
+              <a:t/>
+            </a:r>
             <a:br>
               <a:rPr lang="en-US" sz="4400" dirty="0"/>
             </a:br>
+            <a:r>
+              <a:rPr lang="en-US" sz="1600" dirty="0">
+                <a:latin typeface="Raleway Light" panose="020B0403030101060003" pitchFamily="34" charset="0"/>
+              </a:rPr>
+              <a:t/>
+            </a:r>
             <a:br>
               <a:rPr lang="en-US" sz="1600" dirty="0">
                 <a:latin typeface="Raleway Light" panose="020B0403030101060003" pitchFamily="34" charset="0"/>
               </a:rPr>
             </a:br>
+            <a:r>
+              <a:rPr lang="en-US" sz="1600" dirty="0">
+                <a:latin typeface="Raleway Light" panose="020B0403030101060003" pitchFamily="34" charset="0"/>
+              </a:rPr>
+              <a:t/>
+            </a:r>
             <a:br>
               <a:rPr lang="en-US" sz="1600" dirty="0">
                 <a:latin typeface="Raleway Light" panose="020B0403030101060003" pitchFamily="34" charset="0"/>
               </a:rPr>
             </a:br>
-            <a:endParaRPr lang="iw-IL" sz="1200" b="0" i="0" u="none" strike="noStrike" cap="none" dirty="0">
+            <a:endParaRPr lang="x-none" sz="1200" b="0" i="0" u="none" strike="noStrike" cap="none" dirty="0">
               <a:solidFill>
                 <a:srgbClr val="434343"/>
               </a:solidFill>
@@ -20476,7 +20564,7 @@
               <a:buNone/>
             </a:pPr>
             <a:fld id="{00000000-1234-1234-1234-123412341234}" type="slidenum">
-              <a:rPr lang="iw-IL" sz="1400" b="0" i="0" u="none" strike="noStrike" cap="none">
+              <a:rPr lang="x-none" sz="1400" b="0" i="0" u="none" strike="noStrike" cap="none">
                 <a:solidFill>
                   <a:srgbClr val="000000"/>
                 </a:solidFill>
@@ -20487,7 +20575,7 @@
               </a:rPr>
               <a:t>6</a:t>
             </a:fld>
-            <a:endParaRPr lang="iw-IL" sz="1400" b="0" i="0" u="none" strike="noStrike" cap="none">
+            <a:endParaRPr lang="x-none" sz="1400" b="0" i="0" u="none" strike="noStrike" cap="none">
               <a:solidFill>
                 <a:srgbClr val="000000"/>
               </a:solidFill>
@@ -21231,7 +21319,7 @@
           <p:cNvPr id="11" name="Shape 89">
             <a:extLst>
               <a:ext uri="{FF2B5EF4-FFF2-40B4-BE49-F238E27FC236}">
-                <a16:creationId xmlns:a16="http://schemas.microsoft.com/office/drawing/2014/main" id="{6812C230-70E4-4B14-8761-2BDD37127534}"/>
+                <a16:creationId xmlns="" xmlns:a16="http://schemas.microsoft.com/office/drawing/2014/main" id="{6812C230-70E4-4B14-8761-2BDD37127534}"/>
               </a:ext>
             </a:extLst>
           </p:cNvPr>
@@ -21507,12 +21595,18 @@
                 <a:latin typeface="Raleway Light" panose="020B0403030101060003" pitchFamily="34" charset="0"/>
               </a:rPr>
             </a:br>
+            <a:r>
+              <a:rPr lang="en-US" sz="1050" dirty="0">
+                <a:latin typeface="Raleway Light" panose="020B0403030101060003" pitchFamily="34" charset="0"/>
+              </a:rPr>
+              <a:t/>
+            </a:r>
             <a:br>
               <a:rPr lang="en-US" sz="1050" dirty="0">
                 <a:latin typeface="Raleway Light" panose="020B0403030101060003" pitchFamily="34" charset="0"/>
               </a:rPr>
             </a:br>
-            <a:endParaRPr lang="iw-IL" sz="900" dirty="0">
+            <a:endParaRPr lang="x-none" sz="900" dirty="0">
               <a:latin typeface="Raleway Light" panose="020B0403030101060003" pitchFamily="34" charset="0"/>
             </a:endParaRPr>
           </a:p>
@@ -21528,6 +21622,13 @@
   <p:clrMapOvr>
     <a:masterClrMapping/>
   </p:clrMapOvr>
+  <p:timing>
+    <p:tnLst>
+      <p:par>
+        <p:cTn id="1" dur="indefinite" restart="never" nodeType="tmRoot"/>
+      </p:par>
+    </p:tnLst>
+  </p:timing>
 </p:sld>
 </file>
 
@@ -22152,9 +22253,9 @@
                 <a:buSzPts val="1200"/>
               </a:pPr>
               <a:r>
-                <a:rPr lang="en-US" sz="1800" dirty="0">
+                <a:rPr lang="en-US" sz="2000" dirty="0">
                   <a:solidFill>
-                    <a:srgbClr val="FFFFFF"/>
+                    <a:schemeClr val="tx1"/>
                   </a:solidFill>
                   <a:latin typeface="Raleway Light"/>
                   <a:ea typeface="Raleway Light"/>
@@ -22163,9 +22264,9 @@
                 </a:rPr>
                 <a:t>Traffic Simulator for Development</a:t>
               </a:r>
-              <a:endParaRPr lang="x-none" sz="1800" b="0" i="0" u="none" strike="noStrike" cap="none" dirty="0">
+              <a:endParaRPr lang="x-none" sz="2000" b="0" i="0" u="none" strike="noStrike" cap="none" dirty="0">
                 <a:solidFill>
-                  <a:srgbClr val="FFFFFF"/>
+                  <a:schemeClr val="tx1"/>
                 </a:solidFill>
                 <a:latin typeface="Raleway Light"/>
                 <a:ea typeface="Raleway Light"/>
@@ -22261,8 +22362,8 @@
           </p:nvSpPr>
           <p:spPr>
             <a:xfrm>
-              <a:off x="3718754" y="1613603"/>
-              <a:ext cx="967800" cy="944700"/>
+              <a:off x="3718753" y="1613603"/>
+              <a:ext cx="1018675" cy="944700"/>
             </a:xfrm>
             <a:prstGeom prst="rect">
               <a:avLst/>
@@ -22276,33 +22377,41 @@
             <a:bodyPr wrap="square" lIns="91425" tIns="91425" rIns="91425" bIns="91425" anchor="ctr" anchorCtr="0">
               <a:noAutofit/>
             </a:bodyPr>
-            <a:lstStyle/>
-            <a:p>
-              <a:pPr lvl="0" indent="-63500" algn="ctr">
+            <a:lstStyle>
+              <a:defPPr marR="0" lvl="0" algn="l" rtl="0">
+                <a:lnSpc>
+                  <a:spcPct val="100000"/>
+                </a:lnSpc>
+                <a:spcBef>
+                  <a:spcPts val="0"/>
+                </a:spcBef>
+                <a:spcAft>
+                  <a:spcPts val="0"/>
+                </a:spcAft>
+              </a:defPPr>
+              <a:lvl1pPr indent="-63500" algn="ctr">
                 <a:buClr>
                   <a:srgbClr val="FFFFFF"/>
                 </a:buClr>
                 <a:buSzPts val="1000"/>
-              </a:pPr>
-              <a:r>
-                <a:rPr lang="en-US" sz="1100" dirty="0">
+                <a:defRPr>
                   <a:solidFill>
-                    <a:srgbClr val="FFFFFF"/>
+                    <a:schemeClr val="tx1"/>
                   </a:solidFill>
                   <a:latin typeface="Raleway Light"/>
                   <a:ea typeface="Raleway Light"/>
                   <a:cs typeface="Raleway Light"/>
+                </a:defRPr>
+              </a:lvl1pPr>
+            </a:lstStyle>
+            <a:p>
+              <a:r>
+                <a:rPr lang="en-US" dirty="0">
                   <a:sym typeface="Raleway Light"/>
                 </a:rPr>
                 <a:t>Connects all project modules</a:t>
               </a:r>
-              <a:endParaRPr lang="x-none" sz="1100" b="0" i="0" u="none" strike="noStrike" cap="none" dirty="0">
-                <a:solidFill>
-                  <a:srgbClr val="FFFFFF"/>
-                </a:solidFill>
-                <a:latin typeface="Raleway Light"/>
-                <a:ea typeface="Raleway Light"/>
-                <a:cs typeface="Raleway Light"/>
+              <a:endParaRPr lang="x-none" dirty="0">
                 <a:sym typeface="Raleway Light"/>
               </a:endParaRPr>
             </a:p>
@@ -22394,8 +22503,8 @@
           </p:nvSpPr>
           <p:spPr>
             <a:xfrm>
-              <a:off x="807926" y="3995875"/>
-              <a:ext cx="1189978" cy="944700"/>
+              <a:off x="693573" y="4020091"/>
+              <a:ext cx="1365098" cy="944700"/>
             </a:xfrm>
             <a:prstGeom prst="rect">
               <a:avLst/>
@@ -22418,20 +22527,32 @@
                 <a:buSzPts val="1000"/>
               </a:pPr>
               <a:r>
-                <a:rPr lang="en-US" sz="1200" dirty="0">
+                <a:rPr lang="en-US" sz="1600" dirty="0" smtClean="0">
                   <a:solidFill>
-                    <a:srgbClr val="FFFFFF"/>
+                    <a:schemeClr val="tx1"/>
                   </a:solidFill>
                   <a:latin typeface="Raleway Light"/>
                   <a:ea typeface="Raleway Light"/>
                   <a:cs typeface="Raleway Light"/>
                   <a:sym typeface="Raleway Light"/>
                 </a:rPr>
-                <a:t>Customizable in junction resolution</a:t>
+                <a:t>Supporting </a:t>
               </a:r>
-              <a:endParaRPr lang="x-none" sz="1200" b="0" i="0" u="none" strike="noStrike" cap="none" dirty="0">
+              <a:r>
+                <a:rPr lang="en-US" sz="1600" smtClean="0">
+                  <a:solidFill>
+                    <a:schemeClr val="tx1"/>
+                  </a:solidFill>
+                  <a:latin typeface="Raleway Light"/>
+                  <a:ea typeface="Raleway Light"/>
+                  <a:cs typeface="Raleway Light"/>
+                  <a:sym typeface="Raleway Light"/>
+                </a:rPr>
+                <a:t>Different Structures</a:t>
+              </a:r>
+              <a:endParaRPr lang="x-none" sz="1600" b="0" i="0" u="none" strike="noStrike" cap="none" dirty="0">
                 <a:solidFill>
-                  <a:srgbClr val="FFFFFF"/>
+                  <a:schemeClr val="tx1"/>
                 </a:solidFill>
                 <a:latin typeface="Raleway Light"/>
                 <a:ea typeface="Raleway Light"/>
@@ -24363,8 +24484,20 @@
               </a:rPr>
               <a:t>Simulation</a:t>
             </a:r>
+            <a:r>
+              <a:rPr lang="x-none" sz="5800" b="0" i="0" u="none" strike="noStrike" cap="none" dirty="0">
+                <a:solidFill>
+                  <a:srgbClr val="434343"/>
+                </a:solidFill>
+                <a:latin typeface="Raleway ExtraBold"/>
+                <a:ea typeface="Raleway ExtraBold"/>
+                <a:cs typeface="Raleway ExtraBold"/>
+                <a:sym typeface="Raleway ExtraBold"/>
+              </a:rPr>
+              <a:t/>
+            </a:r>
             <a:br>
-              <a:rPr lang="iw-IL" sz="5800" b="0" i="0" u="none" strike="noStrike" cap="none" dirty="0">
+              <a:rPr lang="x-none" sz="5800" b="0" i="0" u="none" strike="noStrike" cap="none" dirty="0">
                 <a:solidFill>
                   <a:srgbClr val="434343"/>
                 </a:solidFill>
@@ -24386,7 +24519,7 @@
               </a:rPr>
               <a:t>steps</a:t>
             </a:r>
-            <a:endParaRPr lang="iw-IL" sz="5800" b="0" i="0" u="none" strike="noStrike" cap="none" dirty="0">
+            <a:endParaRPr lang="x-none" sz="5800" b="0" i="0" u="none" strike="noStrike" cap="none" dirty="0">
               <a:solidFill>
                 <a:srgbClr val="FFB600"/>
               </a:solidFill>
@@ -24445,7 +24578,7 @@
               <a:buNone/>
             </a:pPr>
             <a:fld id="{00000000-1234-1234-1234-123412341234}" type="slidenum">
-              <a:rPr lang="iw-IL" sz="1400" b="0" i="0" u="none" strike="noStrike" cap="none">
+              <a:rPr lang="x-none" sz="1400" b="0" i="0" u="none" strike="noStrike" cap="none">
                 <a:solidFill>
                   <a:srgbClr val="000000"/>
                 </a:solidFill>
@@ -24456,7 +24589,7 @@
               </a:rPr>
               <a:t>8</a:t>
             </a:fld>
-            <a:endParaRPr lang="iw-IL" sz="1400" b="0" i="0" u="none" strike="noStrike" cap="none">
+            <a:endParaRPr lang="x-none" sz="1400" b="0" i="0" u="none" strike="noStrike" cap="none">
               <a:solidFill>
                 <a:srgbClr val="000000"/>
               </a:solidFill>
@@ -24571,7 +24704,7 @@
               <a:buNone/>
             </a:pPr>
             <a:r>
-              <a:rPr lang="iw-IL" sz="1600" b="1" i="0" u="none" strike="noStrike" cap="none">
+              <a:rPr lang="x-none" sz="1600" b="1" i="0" u="none" strike="noStrike" cap="none">
                 <a:solidFill>
                   <a:srgbClr val="434343"/>
                 </a:solidFill>
@@ -24639,7 +24772,7 @@
               </a:rPr>
               <a:t>Step 1</a:t>
             </a:r>
-            <a:endParaRPr lang="iw-IL" sz="1000" b="0" i="0" u="none" strike="noStrike" cap="none" dirty="0">
+            <a:endParaRPr lang="x-none" sz="1000" b="0" i="0" u="none" strike="noStrike" cap="none" dirty="0">
               <a:solidFill>
                 <a:srgbClr val="434343"/>
               </a:solidFill>
@@ -24720,7 +24853,7 @@
               </a:rPr>
               <a:t>of vehicles</a:t>
             </a:r>
-            <a:endParaRPr lang="iw-IL" sz="1050" b="0" i="0" u="none" strike="noStrike" cap="none" dirty="0">
+            <a:endParaRPr lang="x-none" sz="1050" b="0" i="0" u="none" strike="noStrike" cap="none" dirty="0">
               <a:solidFill>
                 <a:srgbClr val="434343"/>
               </a:solidFill>
@@ -24778,7 +24911,7 @@
               </a:rPr>
               <a:t>Step 2</a:t>
             </a:r>
-            <a:endParaRPr lang="iw-IL" sz="1000" dirty="0">
+            <a:endParaRPr lang="x-none" sz="1000" dirty="0">
               <a:solidFill>
                 <a:srgbClr val="434343"/>
               </a:solidFill>
@@ -24825,7 +24958,7 @@
               <a:buSzPts val="900"/>
             </a:pPr>
             <a:r>
-              <a:rPr lang="en-US" sz="1200" dirty="0">
+              <a:rPr lang="en-US" sz="1200" dirty="0" smtClean="0">
                 <a:solidFill>
                   <a:srgbClr val="434343"/>
                 </a:solidFill>
@@ -24834,32 +24967,9 @@
                 <a:cs typeface="Raleway Light"/>
                 <a:sym typeface="Raleway Light"/>
               </a:rPr>
-              <a:t>Choose frequency</a:t>
+              <a:t>Frequency is Binomial Distributed</a:t>
             </a:r>
-          </a:p>
-          <a:p>
-            <a:pPr lvl="0" indent="-57150" algn="ctr">
-              <a:lnSpc>
-                <a:spcPct val="115000"/>
-              </a:lnSpc>
-              <a:buClr>
-                <a:srgbClr val="434343"/>
-              </a:buClr>
-              <a:buSzPts val="900"/>
-            </a:pPr>
-            <a:r>
-              <a:rPr lang="en-US" sz="1200" dirty="0">
-                <a:solidFill>
-                  <a:srgbClr val="434343"/>
-                </a:solidFill>
-                <a:latin typeface="Raleway Light"/>
-                <a:ea typeface="Raleway Light"/>
-                <a:cs typeface="Raleway Light"/>
-                <a:sym typeface="Raleway Light"/>
-              </a:rPr>
-              <a:t>of the vehicles</a:t>
-            </a:r>
-            <a:endParaRPr lang="iw-IL" sz="1050" dirty="0">
+            <a:endParaRPr lang="x-none" sz="1050" dirty="0">
               <a:solidFill>
                 <a:srgbClr val="434343"/>
               </a:solidFill>
@@ -24977,7 +25087,7 @@
               </a:rPr>
               <a:t>Step 3</a:t>
             </a:r>
-            <a:endParaRPr lang="iw-IL" sz="1000" dirty="0">
+            <a:endParaRPr lang="x-none" sz="1000" dirty="0">
               <a:solidFill>
                 <a:srgbClr val="434343"/>
               </a:solidFill>
@@ -25035,7 +25145,7 @@
               </a:rPr>
               <a:t>Randomly choose initial and final coordinates for each vehicle</a:t>
             </a:r>
-            <a:endParaRPr lang="iw-IL" sz="1050" dirty="0">
+            <a:endParaRPr lang="x-none" sz="1050" dirty="0">
               <a:solidFill>
                 <a:srgbClr val="434343"/>
               </a:solidFill>
@@ -25153,7 +25263,7 @@
               </a:rPr>
               <a:t>Step 4</a:t>
             </a:r>
-            <a:endParaRPr lang="iw-IL" sz="1000" dirty="0">
+            <a:endParaRPr lang="x-none" sz="1000" dirty="0">
               <a:solidFill>
                 <a:srgbClr val="434343"/>
               </a:solidFill>
@@ -25211,7 +25321,7 @@
               </a:rPr>
               <a:t>Run a shortest path algorithm</a:t>
             </a:r>
-            <a:endParaRPr lang="iw-IL" sz="1200" b="0" i="0" u="none" strike="noStrike" cap="none" dirty="0">
+            <a:endParaRPr lang="x-none" sz="1200" b="0" i="0" u="none" strike="noStrike" cap="none" dirty="0">
               <a:solidFill>
                 <a:srgbClr val="434343"/>
               </a:solidFill>
@@ -27000,7 +27110,7 @@
               <a:buNone/>
             </a:pPr>
             <a:r>
-              <a:rPr lang="iw-IL" sz="1600" b="1" i="0" u="none" strike="noStrike" cap="none">
+              <a:rPr lang="x-none" sz="1600" b="1" i="0" u="none" strike="noStrike" cap="none">
                 <a:solidFill>
                   <a:srgbClr val="434343"/>
                 </a:solidFill>
@@ -27057,7 +27167,7 @@
               <a:buNone/>
             </a:pPr>
             <a:r>
-              <a:rPr lang="iw-IL" sz="1600" b="1" i="0" u="none" strike="noStrike" cap="none">
+              <a:rPr lang="x-none" sz="1600" b="1" i="0" u="none" strike="noStrike" cap="none">
                 <a:solidFill>
                   <a:srgbClr val="434343"/>
                 </a:solidFill>
@@ -27114,7 +27224,7 @@
               <a:buNone/>
             </a:pPr>
             <a:r>
-              <a:rPr lang="iw-IL" sz="1600" b="1" i="0" u="none" strike="noStrike" cap="none">
+              <a:rPr lang="x-none" sz="1600" b="1" i="0" u="none" strike="noStrike" cap="none">
                 <a:solidFill>
                   <a:srgbClr val="434343"/>
                 </a:solidFill>
@@ -29553,7 +29663,7 @@
           <p:cNvPr id="31" name="Shape 116">
             <a:extLst>
               <a:ext uri="{FF2B5EF4-FFF2-40B4-BE49-F238E27FC236}">
-                <a16:creationId xmlns:a16="http://schemas.microsoft.com/office/drawing/2014/main" id="{CD1A8997-0FA3-4DF7-95CA-B6EE25833697}"/>
+                <a16:creationId xmlns="" xmlns:a16="http://schemas.microsoft.com/office/drawing/2014/main" id="{CD1A8997-0FA3-4DF7-95CA-B6EE25833697}"/>
               </a:ext>
             </a:extLst>
           </p:cNvPr>
@@ -29617,7 +29727,7 @@
           <p:cNvPr id="5" name="תמונה 4">
             <a:extLst>
               <a:ext uri="{FF2B5EF4-FFF2-40B4-BE49-F238E27FC236}">
-                <a16:creationId xmlns:a16="http://schemas.microsoft.com/office/drawing/2014/main" id="{757BFCD0-6960-4675-94DD-3677D839F616}"/>
+                <a16:creationId xmlns="" xmlns:a16="http://schemas.microsoft.com/office/drawing/2014/main" id="{757BFCD0-6960-4675-94DD-3677D839F616}"/>
               </a:ext>
             </a:extLst>
           </p:cNvPr>
@@ -29647,7 +29757,7 @@
           <p:cNvPr id="34" name="Shape 120">
             <a:extLst>
               <a:ext uri="{FF2B5EF4-FFF2-40B4-BE49-F238E27FC236}">
-                <a16:creationId xmlns:a16="http://schemas.microsoft.com/office/drawing/2014/main" id="{B958C57A-C8F4-4189-ACD6-75B52A688F40}"/>
+                <a16:creationId xmlns="" xmlns:a16="http://schemas.microsoft.com/office/drawing/2014/main" id="{B958C57A-C8F4-4189-ACD6-75B52A688F40}"/>
               </a:ext>
             </a:extLst>
           </p:cNvPr>
@@ -29705,7 +29815,7 @@
           <p:cNvPr id="37" name="Shape 120">
             <a:extLst>
               <a:ext uri="{FF2B5EF4-FFF2-40B4-BE49-F238E27FC236}">
-                <a16:creationId xmlns:a16="http://schemas.microsoft.com/office/drawing/2014/main" id="{FA95ABE2-5FF9-4F54-8114-69ED88A5ED33}"/>
+                <a16:creationId xmlns="" xmlns:a16="http://schemas.microsoft.com/office/drawing/2014/main" id="{FA95ABE2-5FF9-4F54-8114-69ED88A5ED33}"/>
               </a:ext>
             </a:extLst>
           </p:cNvPr>
@@ -29763,7 +29873,7 @@
           <p:cNvPr id="40" name="Shape 120">
             <a:extLst>
               <a:ext uri="{FF2B5EF4-FFF2-40B4-BE49-F238E27FC236}">
-                <a16:creationId xmlns:a16="http://schemas.microsoft.com/office/drawing/2014/main" id="{823A9358-EF57-4663-B872-8FCD4A5FD4D5}"/>
+                <a16:creationId xmlns="" xmlns:a16="http://schemas.microsoft.com/office/drawing/2014/main" id="{823A9358-EF57-4663-B872-8FCD4A5FD4D5}"/>
               </a:ext>
             </a:extLst>
           </p:cNvPr>
@@ -29821,7 +29931,7 @@
           <p:cNvPr id="9" name="תמונה 8">
             <a:extLst>
               <a:ext uri="{FF2B5EF4-FFF2-40B4-BE49-F238E27FC236}">
-                <a16:creationId xmlns:a16="http://schemas.microsoft.com/office/drawing/2014/main" id="{8202CC8C-31D7-4DC6-9D77-174051F8D3E7}"/>
+                <a16:creationId xmlns="" xmlns:a16="http://schemas.microsoft.com/office/drawing/2014/main" id="{8202CC8C-31D7-4DC6-9D77-174051F8D3E7}"/>
               </a:ext>
             </a:extLst>
           </p:cNvPr>
@@ -29851,7 +29961,7 @@
           <p:cNvPr id="10" name="תמונה 9">
             <a:extLst>
               <a:ext uri="{FF2B5EF4-FFF2-40B4-BE49-F238E27FC236}">
-                <a16:creationId xmlns:a16="http://schemas.microsoft.com/office/drawing/2014/main" id="{4BD19B01-692C-4109-B1CD-C11BC8B0C08F}"/>
+                <a16:creationId xmlns="" xmlns:a16="http://schemas.microsoft.com/office/drawing/2014/main" id="{4BD19B01-692C-4109-B1CD-C11BC8B0C08F}"/>
               </a:ext>
             </a:extLst>
           </p:cNvPr>

</xml_diff>

<commit_message>
update of end of semester ppt
</commit_message>
<xml_diff>
--- a/materials/endOfSemseter.pptx
+++ b/materials/endOfSemseter.pptx
@@ -6595,7 +6595,7 @@
           <p:cNvPr id="3" name="תמונה 2">
             <a:extLst>
               <a:ext uri="{FF2B5EF4-FFF2-40B4-BE49-F238E27FC236}">
-                <a16:creationId xmlns="" xmlns:a16="http://schemas.microsoft.com/office/drawing/2014/main" id="{A411248A-21F4-405E-8A65-9FCA8ECC0744}"/>
+                <a16:creationId xmlns:a16="http://schemas.microsoft.com/office/drawing/2014/main" xmlns="" id="{A411248A-21F4-405E-8A65-9FCA8ECC0744}"/>
               </a:ext>
             </a:extLst>
           </p:cNvPr>
@@ -7644,7 +7644,7 @@
           <p:cNvPr id="11" name="Shape 120">
             <a:extLst>
               <a:ext uri="{FF2B5EF4-FFF2-40B4-BE49-F238E27FC236}">
-                <a16:creationId xmlns="" xmlns:a16="http://schemas.microsoft.com/office/drawing/2014/main" id="{7D209ED9-458B-43E3-9607-2EAA917A8C69}"/>
+                <a16:creationId xmlns:a16="http://schemas.microsoft.com/office/drawing/2014/main" xmlns="" id="{7D209ED9-458B-43E3-9607-2EAA917A8C69}"/>
               </a:ext>
             </a:extLst>
           </p:cNvPr>
@@ -7688,7 +7688,7 @@
           <p:cNvPr id="12" name="Shape 120">
             <a:extLst>
               <a:ext uri="{FF2B5EF4-FFF2-40B4-BE49-F238E27FC236}">
-                <a16:creationId xmlns="" xmlns:a16="http://schemas.microsoft.com/office/drawing/2014/main" id="{414827B1-50B4-4198-9F8D-5C7BF93CCB18}"/>
+                <a16:creationId xmlns:a16="http://schemas.microsoft.com/office/drawing/2014/main" xmlns="" id="{414827B1-50B4-4198-9F8D-5C7BF93CCB18}"/>
               </a:ext>
             </a:extLst>
           </p:cNvPr>
@@ -7732,7 +7732,7 @@
           <p:cNvPr id="13" name="Shape 120">
             <a:extLst>
               <a:ext uri="{FF2B5EF4-FFF2-40B4-BE49-F238E27FC236}">
-                <a16:creationId xmlns="" xmlns:a16="http://schemas.microsoft.com/office/drawing/2014/main" id="{A592296E-6C58-4A54-93C9-42E7F960DA6C}"/>
+                <a16:creationId xmlns:a16="http://schemas.microsoft.com/office/drawing/2014/main" xmlns="" id="{A592296E-6C58-4A54-93C9-42E7F960DA6C}"/>
               </a:ext>
             </a:extLst>
           </p:cNvPr>
@@ -7776,7 +7776,7 @@
           <p:cNvPr id="14" name="Shape 120">
             <a:extLst>
               <a:ext uri="{FF2B5EF4-FFF2-40B4-BE49-F238E27FC236}">
-                <a16:creationId xmlns="" xmlns:a16="http://schemas.microsoft.com/office/drawing/2014/main" id="{D636E29E-4D07-4161-ABC9-681FB318A520}"/>
+                <a16:creationId xmlns:a16="http://schemas.microsoft.com/office/drawing/2014/main" xmlns="" id="{D636E29E-4D07-4161-ABC9-681FB318A520}"/>
               </a:ext>
             </a:extLst>
           </p:cNvPr>
@@ -7832,7 +7832,7 @@
           <p:cNvPr id="5" name="תמונה 4">
             <a:extLst>
               <a:ext uri="{FF2B5EF4-FFF2-40B4-BE49-F238E27FC236}">
-                <a16:creationId xmlns="" xmlns:a16="http://schemas.microsoft.com/office/drawing/2014/main" id="{941C507B-7A97-4925-95E9-08591644082A}"/>
+                <a16:creationId xmlns:a16="http://schemas.microsoft.com/office/drawing/2014/main" xmlns="" id="{941C507B-7A97-4925-95E9-08591644082A}"/>
               </a:ext>
             </a:extLst>
           </p:cNvPr>
@@ -7862,7 +7862,7 @@
           <p:cNvPr id="7" name="תמונה 6">
             <a:extLst>
               <a:ext uri="{FF2B5EF4-FFF2-40B4-BE49-F238E27FC236}">
-                <a16:creationId xmlns="" xmlns:a16="http://schemas.microsoft.com/office/drawing/2014/main" id="{71D52B29-30E6-4A4D-A5C4-24860AC34571}"/>
+                <a16:creationId xmlns:a16="http://schemas.microsoft.com/office/drawing/2014/main" xmlns="" id="{71D52B29-30E6-4A4D-A5C4-24860AC34571}"/>
               </a:ext>
             </a:extLst>
           </p:cNvPr>
@@ -7892,7 +7892,7 @@
           <p:cNvPr id="9" name="תמונה 8">
             <a:extLst>
               <a:ext uri="{FF2B5EF4-FFF2-40B4-BE49-F238E27FC236}">
-                <a16:creationId xmlns="" xmlns:a16="http://schemas.microsoft.com/office/drawing/2014/main" id="{2306EFAE-3D4D-4D0A-8E1E-0461AE026C0A}"/>
+                <a16:creationId xmlns:a16="http://schemas.microsoft.com/office/drawing/2014/main" xmlns="" id="{2306EFAE-3D4D-4D0A-8E1E-0461AE026C0A}"/>
               </a:ext>
             </a:extLst>
           </p:cNvPr>
@@ -7922,7 +7922,7 @@
           <p:cNvPr id="15" name="תמונה 14">
             <a:extLst>
               <a:ext uri="{FF2B5EF4-FFF2-40B4-BE49-F238E27FC236}">
-                <a16:creationId xmlns="" xmlns:a16="http://schemas.microsoft.com/office/drawing/2014/main" id="{50BD4322-062D-4938-BD46-6BFC0E980DA8}"/>
+                <a16:creationId xmlns:a16="http://schemas.microsoft.com/office/drawing/2014/main" xmlns="" id="{50BD4322-062D-4938-BD46-6BFC0E980DA8}"/>
               </a:ext>
             </a:extLst>
           </p:cNvPr>
@@ -7952,7 +7952,7 @@
           <p:cNvPr id="19" name="Shape 120">
             <a:extLst>
               <a:ext uri="{FF2B5EF4-FFF2-40B4-BE49-F238E27FC236}">
-                <a16:creationId xmlns="" xmlns:a16="http://schemas.microsoft.com/office/drawing/2014/main" id="{382294A2-A1D8-473D-938A-B19C67B1592B}"/>
+                <a16:creationId xmlns:a16="http://schemas.microsoft.com/office/drawing/2014/main" xmlns="" id="{382294A2-A1D8-473D-938A-B19C67B1592B}"/>
               </a:ext>
             </a:extLst>
           </p:cNvPr>
@@ -7996,7 +7996,7 @@
           <p:cNvPr id="4" name="תמונה 3">
             <a:extLst>
               <a:ext uri="{FF2B5EF4-FFF2-40B4-BE49-F238E27FC236}">
-                <a16:creationId xmlns="" xmlns:a16="http://schemas.microsoft.com/office/drawing/2014/main" id="{2CEDEB26-2760-4E30-A38C-7666CDCE6F95}"/>
+                <a16:creationId xmlns:a16="http://schemas.microsoft.com/office/drawing/2014/main" xmlns="" id="{2CEDEB26-2760-4E30-A38C-7666CDCE6F95}"/>
               </a:ext>
             </a:extLst>
           </p:cNvPr>
@@ -9437,7 +9437,7 @@
           <p:cNvPr id="12" name="Shape 120">
             <a:extLst>
               <a:ext uri="{FF2B5EF4-FFF2-40B4-BE49-F238E27FC236}">
-                <a16:creationId xmlns="" xmlns:a16="http://schemas.microsoft.com/office/drawing/2014/main" id="{59E79919-20C2-4F15-B0BC-F1E20DA1E04A}"/>
+                <a16:creationId xmlns:a16="http://schemas.microsoft.com/office/drawing/2014/main" xmlns="" id="{59E79919-20C2-4F15-B0BC-F1E20DA1E04A}"/>
               </a:ext>
             </a:extLst>
           </p:cNvPr>
@@ -9481,7 +9481,7 @@
           <p:cNvPr id="13" name="Shape 120">
             <a:extLst>
               <a:ext uri="{FF2B5EF4-FFF2-40B4-BE49-F238E27FC236}">
-                <a16:creationId xmlns="" xmlns:a16="http://schemas.microsoft.com/office/drawing/2014/main" id="{57BB212C-B343-44F9-A16C-DD2ADB1B6278}"/>
+                <a16:creationId xmlns:a16="http://schemas.microsoft.com/office/drawing/2014/main" xmlns="" id="{57BB212C-B343-44F9-A16C-DD2ADB1B6278}"/>
               </a:ext>
             </a:extLst>
           </p:cNvPr>
@@ -9525,7 +9525,7 @@
           <p:cNvPr id="14" name="Shape 120">
             <a:extLst>
               <a:ext uri="{FF2B5EF4-FFF2-40B4-BE49-F238E27FC236}">
-                <a16:creationId xmlns="" xmlns:a16="http://schemas.microsoft.com/office/drawing/2014/main" id="{20ABB0CE-E571-4590-BC9D-7AC8CE71B917}"/>
+                <a16:creationId xmlns:a16="http://schemas.microsoft.com/office/drawing/2014/main" xmlns="" id="{20ABB0CE-E571-4590-BC9D-7AC8CE71B917}"/>
               </a:ext>
             </a:extLst>
           </p:cNvPr>
@@ -9583,7 +9583,7 @@
           <p:cNvPr id="15" name="תמונה 14">
             <a:extLst>
               <a:ext uri="{FF2B5EF4-FFF2-40B4-BE49-F238E27FC236}">
-                <a16:creationId xmlns="" xmlns:a16="http://schemas.microsoft.com/office/drawing/2014/main" id="{D3228186-A14B-4104-B005-7591EAD2A6C5}"/>
+                <a16:creationId xmlns:a16="http://schemas.microsoft.com/office/drawing/2014/main" xmlns="" id="{D3228186-A14B-4104-B005-7591EAD2A6C5}"/>
               </a:ext>
             </a:extLst>
           </p:cNvPr>
@@ -9613,7 +9613,7 @@
           <p:cNvPr id="5" name="תמונה 4">
             <a:extLst>
               <a:ext uri="{FF2B5EF4-FFF2-40B4-BE49-F238E27FC236}">
-                <a16:creationId xmlns="" xmlns:a16="http://schemas.microsoft.com/office/drawing/2014/main" id="{455C4DFB-4624-4F7F-B920-8FC2BD692A04}"/>
+                <a16:creationId xmlns:a16="http://schemas.microsoft.com/office/drawing/2014/main" xmlns="" id="{455C4DFB-4624-4F7F-B920-8FC2BD692A04}"/>
               </a:ext>
             </a:extLst>
           </p:cNvPr>
@@ -9643,7 +9643,7 @@
           <p:cNvPr id="7" name="תמונה 6">
             <a:extLst>
               <a:ext uri="{FF2B5EF4-FFF2-40B4-BE49-F238E27FC236}">
-                <a16:creationId xmlns="" xmlns:a16="http://schemas.microsoft.com/office/drawing/2014/main" id="{19D223FB-70B5-41F0-9E0D-CAB9A9CEBACA}"/>
+                <a16:creationId xmlns:a16="http://schemas.microsoft.com/office/drawing/2014/main" xmlns="" id="{19D223FB-70B5-41F0-9E0D-CAB9A9CEBACA}"/>
               </a:ext>
             </a:extLst>
           </p:cNvPr>
@@ -12862,7 +12862,7 @@
           <p:cNvPr id="28" name="תמונה 4">
             <a:extLst>
               <a:ext uri="{FF2B5EF4-FFF2-40B4-BE49-F238E27FC236}">
-                <a16:creationId xmlns="" xmlns:a16="http://schemas.microsoft.com/office/drawing/2014/main" id="{FB66E08C-5DC0-4ABD-B0A6-5FB13E986FD9}"/>
+                <a16:creationId xmlns:a16="http://schemas.microsoft.com/office/drawing/2014/main" xmlns="" id="{FB66E08C-5DC0-4ABD-B0A6-5FB13E986FD9}"/>
               </a:ext>
             </a:extLst>
           </p:cNvPr>
@@ -12920,7 +12920,7 @@
           <p:cNvPr id="15" name="תמונה 14">
             <a:extLst>
               <a:ext uri="{FF2B5EF4-FFF2-40B4-BE49-F238E27FC236}">
-                <a16:creationId xmlns="" xmlns:a16="http://schemas.microsoft.com/office/drawing/2014/main" id="{217F2B99-A964-403F-BAC0-82354EEA57DD}"/>
+                <a16:creationId xmlns:a16="http://schemas.microsoft.com/office/drawing/2014/main" xmlns="" id="{217F2B99-A964-403F-BAC0-82354EEA57DD}"/>
               </a:ext>
             </a:extLst>
           </p:cNvPr>
@@ -12971,7 +12971,7 @@
           <p:cNvPr id="13" name="תמונה 12">
             <a:extLst>
               <a:ext uri="{FF2B5EF4-FFF2-40B4-BE49-F238E27FC236}">
-                <a16:creationId xmlns="" xmlns:a16="http://schemas.microsoft.com/office/drawing/2014/main" id="{B0549EAA-6F9B-42F0-BC42-ABD8BB98F11C}"/>
+                <a16:creationId xmlns:a16="http://schemas.microsoft.com/office/drawing/2014/main" xmlns="" id="{B0549EAA-6F9B-42F0-BC42-ABD8BB98F11C}"/>
               </a:ext>
             </a:extLst>
           </p:cNvPr>
@@ -13029,7 +13029,7 @@
           <p:cNvPr id="11" name="תמונה 10">
             <a:extLst>
               <a:ext uri="{FF2B5EF4-FFF2-40B4-BE49-F238E27FC236}">
-                <a16:creationId xmlns="" xmlns:a16="http://schemas.microsoft.com/office/drawing/2014/main" id="{B959F5C2-0943-4036-852D-319C2F9652D6}"/>
+                <a16:creationId xmlns:a16="http://schemas.microsoft.com/office/drawing/2014/main" xmlns="" id="{B959F5C2-0943-4036-852D-319C2F9652D6}"/>
               </a:ext>
             </a:extLst>
           </p:cNvPr>
@@ -13080,7 +13080,7 @@
           <p:cNvPr id="9" name="תמונה 8">
             <a:extLst>
               <a:ext uri="{FF2B5EF4-FFF2-40B4-BE49-F238E27FC236}">
-                <a16:creationId xmlns="" xmlns:a16="http://schemas.microsoft.com/office/drawing/2014/main" id="{7C78317B-6461-485D-ACB7-9F6D86FFB6BF}"/>
+                <a16:creationId xmlns:a16="http://schemas.microsoft.com/office/drawing/2014/main" xmlns="" id="{7C78317B-6461-485D-ACB7-9F6D86FFB6BF}"/>
               </a:ext>
             </a:extLst>
           </p:cNvPr>
@@ -13131,7 +13131,7 @@
           <p:cNvPr id="5" name="תמונה 4">
             <a:extLst>
               <a:ext uri="{FF2B5EF4-FFF2-40B4-BE49-F238E27FC236}">
-                <a16:creationId xmlns="" xmlns:a16="http://schemas.microsoft.com/office/drawing/2014/main" id="{8E0D8C80-BA63-472B-BC85-0AF1E159B30D}"/>
+                <a16:creationId xmlns:a16="http://schemas.microsoft.com/office/drawing/2014/main" xmlns="" id="{8E0D8C80-BA63-472B-BC85-0AF1E159B30D}"/>
               </a:ext>
             </a:extLst>
           </p:cNvPr>
@@ -13182,7 +13182,7 @@
           <p:cNvPr id="3" name="תמונה 2">
             <a:extLst>
               <a:ext uri="{FF2B5EF4-FFF2-40B4-BE49-F238E27FC236}">
-                <a16:creationId xmlns="" xmlns:a16="http://schemas.microsoft.com/office/drawing/2014/main" id="{3F9781C7-2D6C-4E8A-9CEC-D2516FA85FC2}"/>
+                <a16:creationId xmlns:a16="http://schemas.microsoft.com/office/drawing/2014/main" xmlns="" id="{3F9781C7-2D6C-4E8A-9CEC-D2516FA85FC2}"/>
               </a:ext>
             </a:extLst>
           </p:cNvPr>
@@ -15662,7 +15662,7 @@
           <p:cNvPr id="26" name="Shape 78">
             <a:extLst>
               <a:ext uri="{FF2B5EF4-FFF2-40B4-BE49-F238E27FC236}">
-                <a16:creationId xmlns="" xmlns:a16="http://schemas.microsoft.com/office/drawing/2014/main" id="{F16C477C-8D57-48FB-BDC2-96EF0462CFEA}"/>
+                <a16:creationId xmlns:a16="http://schemas.microsoft.com/office/drawing/2014/main" xmlns="" id="{F16C477C-8D57-48FB-BDC2-96EF0462CFEA}"/>
               </a:ext>
             </a:extLst>
           </p:cNvPr>
@@ -15728,7 +15728,7 @@
           <p:cNvPr id="27" name="Shape 79">
             <a:extLst>
               <a:ext uri="{FF2B5EF4-FFF2-40B4-BE49-F238E27FC236}">
-                <a16:creationId xmlns="" xmlns:a16="http://schemas.microsoft.com/office/drawing/2014/main" id="{FA83FC01-AC62-4B6A-B9E7-0122CEDD05DB}"/>
+                <a16:creationId xmlns:a16="http://schemas.microsoft.com/office/drawing/2014/main" xmlns="" id="{FA83FC01-AC62-4B6A-B9E7-0122CEDD05DB}"/>
               </a:ext>
             </a:extLst>
           </p:cNvPr>
@@ -15962,7 +15962,7 @@
           <p:cNvPr id="3" name="תמונה 2">
             <a:extLst>
               <a:ext uri="{FF2B5EF4-FFF2-40B4-BE49-F238E27FC236}">
-                <a16:creationId xmlns="" xmlns:a16="http://schemas.microsoft.com/office/drawing/2014/main" id="{A411248A-21F4-405E-8A65-9FCA8ECC0744}"/>
+                <a16:creationId xmlns:a16="http://schemas.microsoft.com/office/drawing/2014/main" xmlns="" id="{A411248A-21F4-405E-8A65-9FCA8ECC0744}"/>
               </a:ext>
             </a:extLst>
           </p:cNvPr>
@@ -15992,7 +15992,7 @@
           <p:cNvPr id="10" name="Shape 104">
             <a:extLst>
               <a:ext uri="{FF2B5EF4-FFF2-40B4-BE49-F238E27FC236}">
-                <a16:creationId xmlns="" xmlns:a16="http://schemas.microsoft.com/office/drawing/2014/main" id="{82FBC332-790B-4DC7-9355-E01A91F5F023}"/>
+                <a16:creationId xmlns:a16="http://schemas.microsoft.com/office/drawing/2014/main" xmlns="" id="{82FBC332-790B-4DC7-9355-E01A91F5F023}"/>
               </a:ext>
             </a:extLst>
           </p:cNvPr>
@@ -16254,7 +16254,7 @@
           <p:cNvPr id="11" name="Shape 104">
             <a:extLst>
               <a:ext uri="{FF2B5EF4-FFF2-40B4-BE49-F238E27FC236}">
-                <a16:creationId xmlns="" xmlns:a16="http://schemas.microsoft.com/office/drawing/2014/main" id="{DE6DE8DC-90F6-4E85-BE33-853E748E6601}"/>
+                <a16:creationId xmlns:a16="http://schemas.microsoft.com/office/drawing/2014/main" xmlns="" id="{DE6DE8DC-90F6-4E85-BE33-853E748E6601}"/>
               </a:ext>
             </a:extLst>
           </p:cNvPr>
@@ -16525,7 +16525,7 @@
           <p:cNvPr id="8" name="תמונה 7" descr="תמונה שמכילה אובייקט&#10;&#10;תיאור שנוצר ברמת מהימנות גבוהה">
             <a:extLst>
               <a:ext uri="{FF2B5EF4-FFF2-40B4-BE49-F238E27FC236}">
-                <a16:creationId xmlns="" xmlns:a16="http://schemas.microsoft.com/office/drawing/2014/main" id="{6CC9618B-BA71-4E08-9BF5-9E0744848BF4}"/>
+                <a16:creationId xmlns:a16="http://schemas.microsoft.com/office/drawing/2014/main" xmlns="" id="{6CC9618B-BA71-4E08-9BF5-9E0744848BF4}"/>
               </a:ext>
             </a:extLst>
           </p:cNvPr>
@@ -19846,7 +19846,7 @@
           <p:cNvPr id="31" name="Shape 608">
             <a:extLst>
               <a:ext uri="{FF2B5EF4-FFF2-40B4-BE49-F238E27FC236}">
-                <a16:creationId xmlns="" xmlns:a16="http://schemas.microsoft.com/office/drawing/2014/main" id="{3C3406CB-9710-4324-9594-F6D9E6E4B494}"/>
+                <a16:creationId xmlns:a16="http://schemas.microsoft.com/office/drawing/2014/main" xmlns="" id="{3C3406CB-9710-4324-9594-F6D9E6E4B494}"/>
               </a:ext>
             </a:extLst>
           </p:cNvPr>
@@ -19866,7 +19866,7 @@
             <p:cNvPr id="32" name="Shape 609">
               <a:extLst>
                 <a:ext uri="{FF2B5EF4-FFF2-40B4-BE49-F238E27FC236}">
-                  <a16:creationId xmlns="" xmlns:a16="http://schemas.microsoft.com/office/drawing/2014/main" id="{D900634C-2D87-4E40-ADCD-777A4BC6A6FD}"/>
+                  <a16:creationId xmlns:a16="http://schemas.microsoft.com/office/drawing/2014/main" xmlns="" id="{D900634C-2D87-4E40-ADCD-777A4BC6A6FD}"/>
                 </a:ext>
               </a:extLst>
             </p:cNvPr>
@@ -19935,7 +19935,7 @@
             <p:cNvPr id="33" name="Shape 610">
               <a:extLst>
                 <a:ext uri="{FF2B5EF4-FFF2-40B4-BE49-F238E27FC236}">
-                  <a16:creationId xmlns="" xmlns:a16="http://schemas.microsoft.com/office/drawing/2014/main" id="{B1A786AC-B994-4262-A337-76A137C7A193}"/>
+                  <a16:creationId xmlns:a16="http://schemas.microsoft.com/office/drawing/2014/main" xmlns="" id="{B1A786AC-B994-4262-A337-76A137C7A193}"/>
                 </a:ext>
               </a:extLst>
             </p:cNvPr>
@@ -19997,7 +19997,7 @@
           <p:cNvPr id="30" name="Shape 116">
             <a:extLst>
               <a:ext uri="{FF2B5EF4-FFF2-40B4-BE49-F238E27FC236}">
-                <a16:creationId xmlns="" xmlns:a16="http://schemas.microsoft.com/office/drawing/2014/main" id="{87750F78-A854-42B9-B963-EC0831B63BF4}"/>
+                <a16:creationId xmlns:a16="http://schemas.microsoft.com/office/drawing/2014/main" xmlns="" id="{87750F78-A854-42B9-B963-EC0831B63BF4}"/>
               </a:ext>
             </a:extLst>
           </p:cNvPr>
@@ -21319,7 +21319,7 @@
           <p:cNvPr id="11" name="Shape 89">
             <a:extLst>
               <a:ext uri="{FF2B5EF4-FFF2-40B4-BE49-F238E27FC236}">
-                <a16:creationId xmlns="" xmlns:a16="http://schemas.microsoft.com/office/drawing/2014/main" id="{6812C230-70E4-4B14-8761-2BDD37127534}"/>
+                <a16:creationId xmlns:a16="http://schemas.microsoft.com/office/drawing/2014/main" xmlns="" id="{6812C230-70E4-4B14-8761-2BDD37127534}"/>
               </a:ext>
             </a:extLst>
           </p:cNvPr>
@@ -29663,7 +29663,7 @@
           <p:cNvPr id="31" name="Shape 116">
             <a:extLst>
               <a:ext uri="{FF2B5EF4-FFF2-40B4-BE49-F238E27FC236}">
-                <a16:creationId xmlns="" xmlns:a16="http://schemas.microsoft.com/office/drawing/2014/main" id="{CD1A8997-0FA3-4DF7-95CA-B6EE25833697}"/>
+                <a16:creationId xmlns:a16="http://schemas.microsoft.com/office/drawing/2014/main" xmlns="" id="{CD1A8997-0FA3-4DF7-95CA-B6EE25833697}"/>
               </a:ext>
             </a:extLst>
           </p:cNvPr>
@@ -29727,7 +29727,7 @@
           <p:cNvPr id="5" name="תמונה 4">
             <a:extLst>
               <a:ext uri="{FF2B5EF4-FFF2-40B4-BE49-F238E27FC236}">
-                <a16:creationId xmlns="" xmlns:a16="http://schemas.microsoft.com/office/drawing/2014/main" id="{757BFCD0-6960-4675-94DD-3677D839F616}"/>
+                <a16:creationId xmlns:a16="http://schemas.microsoft.com/office/drawing/2014/main" xmlns="" id="{757BFCD0-6960-4675-94DD-3677D839F616}"/>
               </a:ext>
             </a:extLst>
           </p:cNvPr>
@@ -29757,7 +29757,7 @@
           <p:cNvPr id="34" name="Shape 120">
             <a:extLst>
               <a:ext uri="{FF2B5EF4-FFF2-40B4-BE49-F238E27FC236}">
-                <a16:creationId xmlns="" xmlns:a16="http://schemas.microsoft.com/office/drawing/2014/main" id="{B958C57A-C8F4-4189-ACD6-75B52A688F40}"/>
+                <a16:creationId xmlns:a16="http://schemas.microsoft.com/office/drawing/2014/main" xmlns="" id="{B958C57A-C8F4-4189-ACD6-75B52A688F40}"/>
               </a:ext>
             </a:extLst>
           </p:cNvPr>
@@ -29815,7 +29815,7 @@
           <p:cNvPr id="37" name="Shape 120">
             <a:extLst>
               <a:ext uri="{FF2B5EF4-FFF2-40B4-BE49-F238E27FC236}">
-                <a16:creationId xmlns="" xmlns:a16="http://schemas.microsoft.com/office/drawing/2014/main" id="{FA95ABE2-5FF9-4F54-8114-69ED88A5ED33}"/>
+                <a16:creationId xmlns:a16="http://schemas.microsoft.com/office/drawing/2014/main" xmlns="" id="{FA95ABE2-5FF9-4F54-8114-69ED88A5ED33}"/>
               </a:ext>
             </a:extLst>
           </p:cNvPr>
@@ -29873,7 +29873,7 @@
           <p:cNvPr id="40" name="Shape 120">
             <a:extLst>
               <a:ext uri="{FF2B5EF4-FFF2-40B4-BE49-F238E27FC236}">
-                <a16:creationId xmlns="" xmlns:a16="http://schemas.microsoft.com/office/drawing/2014/main" id="{823A9358-EF57-4663-B872-8FCD4A5FD4D5}"/>
+                <a16:creationId xmlns:a16="http://schemas.microsoft.com/office/drawing/2014/main" xmlns="" id="{823A9358-EF57-4663-B872-8FCD4A5FD4D5}"/>
               </a:ext>
             </a:extLst>
           </p:cNvPr>
@@ -29931,7 +29931,7 @@
           <p:cNvPr id="9" name="תמונה 8">
             <a:extLst>
               <a:ext uri="{FF2B5EF4-FFF2-40B4-BE49-F238E27FC236}">
-                <a16:creationId xmlns="" xmlns:a16="http://schemas.microsoft.com/office/drawing/2014/main" id="{8202CC8C-31D7-4DC6-9D77-174051F8D3E7}"/>
+                <a16:creationId xmlns:a16="http://schemas.microsoft.com/office/drawing/2014/main" xmlns="" id="{8202CC8C-31D7-4DC6-9D77-174051F8D3E7}"/>
               </a:ext>
             </a:extLst>
           </p:cNvPr>
@@ -29961,7 +29961,7 @@
           <p:cNvPr id="10" name="תמונה 9">
             <a:extLst>
               <a:ext uri="{FF2B5EF4-FFF2-40B4-BE49-F238E27FC236}">
-                <a16:creationId xmlns="" xmlns:a16="http://schemas.microsoft.com/office/drawing/2014/main" id="{4BD19B01-692C-4109-B1CD-C11BC8B0C08F}"/>
+                <a16:creationId xmlns:a16="http://schemas.microsoft.com/office/drawing/2014/main" xmlns="" id="{4BD19B01-692C-4109-B1CD-C11BC8B0C08F}"/>
               </a:ext>
             </a:extLst>
           </p:cNvPr>

</xml_diff>